<commit_message>
upute pdf i pptx
</commit_message>
<xml_diff>
--- a/data/istrazivanje/002_1_upute_za_istrazivanje.pptx
+++ b/data/istrazivanje/002_1_upute_za_istrazivanje.pptx
@@ -119,7 +119,7 @@
   </p:defaultTextStyle>
   <p:extLst>
     <p:ext uri="{EFAFB233-063F-42B5-8137-9DF3F51BA10A}">
-      <p15:sldGuideLst xmlns="" xmlns:p15="http://schemas.microsoft.com/office/powerpoint/2012/main">
+      <p15:sldGuideLst xmlns:p15="http://schemas.microsoft.com/office/powerpoint/2012/main" xmlns="">
         <p15:guide id="1" orient="horz" pos="2160">
           <p15:clr>
             <a:srgbClr val="A4A3A4"/>
@@ -219,7 +219,7 @@
             <a:fld id="{F166AA82-D024-43CF-936D-19CC7B58933F}" type="datetimeFigureOut">
               <a:rPr lang="sr-Latn-CS" smtClean="0"/>
               <a:pPr/>
-              <a:t>16.10.2017.</a:t>
+              <a:t>17.10.2017.</a:t>
             </a:fld>
             <a:endParaRPr lang="hr-HR"/>
           </a:p>
@@ -8658,7 +8658,7 @@
         <p:spPr>
           <a:xfrm>
             <a:off x="467544" y="5668978"/>
-            <a:ext cx="1214446" cy="357190"/>
+            <a:ext cx="1112852" cy="357190"/>
           </a:xfrm>
           <a:prstGeom prst="rect">
             <a:avLst/>
@@ -9593,7 +9593,14 @@
                 <a:latin typeface="Calibri" pitchFamily="34" charset="0"/>
                 <a:cs typeface="Calibri" pitchFamily="34" charset="0"/>
               </a:rPr>
-              <a:t>Mladi i izvanškolske aktivnosti</a:t>
+              <a:t>Mladi </a:t>
+            </a:r>
+            <a:r>
+              <a:rPr lang="hr-HR" sz="2400" dirty="0" smtClean="0">
+                <a:latin typeface="Calibri" pitchFamily="34" charset="0"/>
+                <a:cs typeface="Calibri" pitchFamily="34" charset="0"/>
+              </a:rPr>
+              <a:t>i izvanškolske aktivnosti</a:t>
             </a:r>
           </a:p>
           <a:p>
@@ -9654,28 +9661,18 @@
               <a:buChar char="–"/>
             </a:pPr>
             <a:r>
-              <a:rPr lang="hr-HR" sz="2400" dirty="0" smtClean="0">
-                <a:latin typeface="Calibri" pitchFamily="34" charset="0"/>
-                <a:cs typeface="Calibri" pitchFamily="34" charset="0"/>
-              </a:rPr>
-              <a:t>Mladi i alkohol</a:t>
-            </a:r>
-          </a:p>
-          <a:p>
-            <a:pPr>
-              <a:spcBef>
-                <a:spcPts val="0"/>
-              </a:spcBef>
-              <a:buSzPct val="100000"/>
-              <a:buFont typeface="Calibri" panose="020F0502020204030204" pitchFamily="34" charset="0"/>
-              <a:buChar char="–"/>
-            </a:pPr>
-            <a:r>
               <a:rPr lang="pl-PL" sz="2400" dirty="0" smtClean="0">
                 <a:latin typeface="Calibri" pitchFamily="34" charset="0"/>
                 <a:cs typeface="Calibri" pitchFamily="34" charset="0"/>
               </a:rPr>
-              <a:t>Utjecaj prehrane na aktivnosti mladih</a:t>
+              <a:t>Utjecaj </a:t>
+            </a:r>
+            <a:r>
+              <a:rPr lang="pl-PL" sz="2400" dirty="0" smtClean="0">
+                <a:latin typeface="Calibri" pitchFamily="34" charset="0"/>
+                <a:cs typeface="Calibri" pitchFamily="34" charset="0"/>
+              </a:rPr>
+              <a:t>prehrane na aktivnosti mladih</a:t>
             </a:r>
           </a:p>
           <a:p>
@@ -9752,15 +9749,7 @@
             </a:pPr>
             <a:r>
               <a:rPr lang="hr-HR" dirty="0" smtClean="0"/>
-              <a:t>TEME </a:t>
-            </a:r>
-            <a:r>
-              <a:rPr lang="hr-HR" dirty="0" smtClean="0"/>
-              <a:t>ISTRAŽIVANJA PRIJAŠNJIH </a:t>
-            </a:r>
-            <a:r>
-              <a:rPr lang="hr-HR" dirty="0" smtClean="0"/>
-              <a:t>GODINA</a:t>
+              <a:t>TEME ISTRAŽIVANJA PRIJAŠNJIH GODINA</a:t>
             </a:r>
             <a:endParaRPr lang="hr-HR" dirty="0"/>
           </a:p>
@@ -9958,8 +9947,8 @@
         </p:nvSpPr>
         <p:spPr>
           <a:xfrm>
-            <a:off x="5752398" y="3752467"/>
-            <a:ext cx="285752" cy="1571636"/>
+            <a:off x="5752398" y="3776071"/>
+            <a:ext cx="285752" cy="1180794"/>
           </a:xfrm>
           <a:prstGeom prst="rightBrace">
             <a:avLst>
@@ -10008,7 +9997,7 @@
         </p:nvSpPr>
         <p:spPr>
           <a:xfrm>
-            <a:off x="6038150" y="4323971"/>
+            <a:off x="6129046" y="4135635"/>
             <a:ext cx="1414170" cy="461665"/>
           </a:xfrm>
           <a:prstGeom prst="rect">
@@ -10050,7 +10039,7 @@
         </p:nvSpPr>
         <p:spPr>
           <a:xfrm>
-            <a:off x="4358256" y="5496462"/>
+            <a:off x="4358256" y="5157192"/>
             <a:ext cx="285752" cy="1260673"/>
           </a:xfrm>
           <a:prstGeom prst="rightBrace">
@@ -10100,7 +10089,7 @@
         </p:nvSpPr>
         <p:spPr>
           <a:xfrm>
-            <a:off x="4714876" y="5835022"/>
+            <a:off x="4714876" y="5495752"/>
             <a:ext cx="1414170" cy="461665"/>
           </a:xfrm>
           <a:prstGeom prst="rect">

</xml_diff>